<commit_message>
updated fig to save space
</commit_message>
<xml_diff>
--- a/docs/vldb16/figures/figs.pptx
+++ b/docs/vldb16/figures/figs.pptx
@@ -13,6 +13,7 @@
     <p:sldId id="262" r:id="rId7"/>
     <p:sldId id="263" r:id="rId8"/>
     <p:sldId id="261" r:id="rId9"/>
+    <p:sldId id="264" r:id="rId10"/>
   </p:sldIdLst>
   <p:sldSz cx="9144000" cy="6858000" type="screen4x3"/>
   <p:notesSz cx="6858000" cy="9144000"/>
@@ -113,7 +114,7 @@
   </p:defaultTextStyle>
   <p:extLst>
     <p:ext uri="{EFAFB233-063F-42B5-8137-9DF3F51BA10A}">
-      <p15:sldGuideLst xmlns="" xmlns:p15="http://schemas.microsoft.com/office/powerpoint/2012/main">
+      <p15:sldGuideLst xmlns:p15="http://schemas.microsoft.com/office/powerpoint/2012/main">
         <p15:guide id="1" orient="horz" pos="2160">
           <p15:clr>
             <a:srgbClr val="A4A3A4"/>
@@ -311,7 +312,7 @@
           <a:p>
             <a:fld id="{E53DFF73-D480-144E-A535-5E58F29F2980}" type="datetimeFigureOut">
               <a:rPr lang="en-US" smtClean="0"/>
-              <a:t>11/19/15</a:t>
+              <a:t>1/19/16</a:t>
             </a:fld>
             <a:endParaRPr lang="en-US"/>
           </a:p>
@@ -481,7 +482,7 @@
           <a:p>
             <a:fld id="{E53DFF73-D480-144E-A535-5E58F29F2980}" type="datetimeFigureOut">
               <a:rPr lang="en-US" smtClean="0"/>
-              <a:t>11/19/15</a:t>
+              <a:t>1/19/16</a:t>
             </a:fld>
             <a:endParaRPr lang="en-US"/>
           </a:p>
@@ -661,7 +662,7 @@
           <a:p>
             <a:fld id="{E53DFF73-D480-144E-A535-5E58F29F2980}" type="datetimeFigureOut">
               <a:rPr lang="en-US" smtClean="0"/>
-              <a:t>11/19/15</a:t>
+              <a:t>1/19/16</a:t>
             </a:fld>
             <a:endParaRPr lang="en-US"/>
           </a:p>
@@ -831,7 +832,7 @@
           <a:p>
             <a:fld id="{E53DFF73-D480-144E-A535-5E58F29F2980}" type="datetimeFigureOut">
               <a:rPr lang="en-US" smtClean="0"/>
-              <a:t>11/19/15</a:t>
+              <a:t>1/19/16</a:t>
             </a:fld>
             <a:endParaRPr lang="en-US"/>
           </a:p>
@@ -1077,7 +1078,7 @@
           <a:p>
             <a:fld id="{E53DFF73-D480-144E-A535-5E58F29F2980}" type="datetimeFigureOut">
               <a:rPr lang="en-US" smtClean="0"/>
-              <a:t>11/19/15</a:t>
+              <a:t>1/19/16</a:t>
             </a:fld>
             <a:endParaRPr lang="en-US"/>
           </a:p>
@@ -1365,7 +1366,7 @@
           <a:p>
             <a:fld id="{E53DFF73-D480-144E-A535-5E58F29F2980}" type="datetimeFigureOut">
               <a:rPr lang="en-US" smtClean="0"/>
-              <a:t>11/19/15</a:t>
+              <a:t>1/19/16</a:t>
             </a:fld>
             <a:endParaRPr lang="en-US"/>
           </a:p>
@@ -1787,7 +1788,7 @@
           <a:p>
             <a:fld id="{E53DFF73-D480-144E-A535-5E58F29F2980}" type="datetimeFigureOut">
               <a:rPr lang="en-US" smtClean="0"/>
-              <a:t>11/19/15</a:t>
+              <a:t>1/19/16</a:t>
             </a:fld>
             <a:endParaRPr lang="en-US"/>
           </a:p>
@@ -1905,7 +1906,7 @@
           <a:p>
             <a:fld id="{E53DFF73-D480-144E-A535-5E58F29F2980}" type="datetimeFigureOut">
               <a:rPr lang="en-US" smtClean="0"/>
-              <a:t>11/19/15</a:t>
+              <a:t>1/19/16</a:t>
             </a:fld>
             <a:endParaRPr lang="en-US"/>
           </a:p>
@@ -2000,7 +2001,7 @@
           <a:p>
             <a:fld id="{E53DFF73-D480-144E-A535-5E58F29F2980}" type="datetimeFigureOut">
               <a:rPr lang="en-US" smtClean="0"/>
-              <a:t>11/19/15</a:t>
+              <a:t>1/19/16</a:t>
             </a:fld>
             <a:endParaRPr lang="en-US"/>
           </a:p>
@@ -2277,7 +2278,7 @@
           <a:p>
             <a:fld id="{E53DFF73-D480-144E-A535-5E58F29F2980}" type="datetimeFigureOut">
               <a:rPr lang="en-US" smtClean="0"/>
-              <a:t>11/19/15</a:t>
+              <a:t>1/19/16</a:t>
             </a:fld>
             <a:endParaRPr lang="en-US"/>
           </a:p>
@@ -2530,7 +2531,7 @@
           <a:p>
             <a:fld id="{E53DFF73-D480-144E-A535-5E58F29F2980}" type="datetimeFigureOut">
               <a:rPr lang="en-US" smtClean="0"/>
-              <a:t>11/19/15</a:t>
+              <a:t>1/19/16</a:t>
             </a:fld>
             <a:endParaRPr lang="en-US"/>
           </a:p>
@@ -2743,7 +2744,7 @@
           <a:p>
             <a:fld id="{E53DFF73-D480-144E-A535-5E58F29F2980}" type="datetimeFigureOut">
               <a:rPr lang="en-US" smtClean="0"/>
-              <a:t>11/19/15</a:t>
+              <a:t>1/19/16</a:t>
             </a:fld>
             <a:endParaRPr lang="en-US"/>
           </a:p>
@@ -3480,7 +3481,7 @@
   <p:timing>
     <p:tnLst>
       <p:par>
-        <p:cTn xmlns:p14="http://schemas.microsoft.com/office/powerpoint/2010/main" id="1" dur="indefinite" restart="never" nodeType="tmRoot"/>
+        <p:cTn id="1" dur="indefinite" restart="never" nodeType="tmRoot"/>
       </p:par>
     </p:tnLst>
   </p:timing>
@@ -4299,7 +4300,7 @@
   <p:timing>
     <p:tnLst>
       <p:par>
-        <p:cTn xmlns:p14="http://schemas.microsoft.com/office/powerpoint/2010/main" id="1" dur="indefinite" restart="never" nodeType="tmRoot"/>
+        <p:cTn id="1" dur="indefinite" restart="never" nodeType="tmRoot"/>
       </p:par>
     </p:tnLst>
   </p:timing>
@@ -5036,7 +5037,7 @@
   <p:timing>
     <p:tnLst>
       <p:par>
-        <p:cTn xmlns:p14="http://schemas.microsoft.com/office/powerpoint/2010/main" id="1" dur="indefinite" restart="never" nodeType="tmRoot"/>
+        <p:cTn id="1" dur="indefinite" restart="never" nodeType="tmRoot"/>
       </p:par>
     </p:tnLst>
   </p:timing>
@@ -12475,7 +12476,7 @@
   <p:timing>
     <p:tnLst>
       <p:par>
-        <p:cTn xmlns:p14="http://schemas.microsoft.com/office/powerpoint/2010/main" id="1" dur="indefinite" restart="never" nodeType="tmRoot"/>
+        <p:cTn id="1" dur="indefinite" restart="never" nodeType="tmRoot"/>
       </p:par>
     </p:tnLst>
   </p:timing>
@@ -15148,7 +15149,7 @@
   <p:timing>
     <p:tnLst>
       <p:par>
-        <p:cTn xmlns:p14="http://schemas.microsoft.com/office/powerpoint/2010/main" id="1" dur="indefinite" restart="never" nodeType="tmRoot"/>
+        <p:cTn id="1" dur="indefinite" restart="never" nodeType="tmRoot"/>
       </p:par>
     </p:tnLst>
   </p:timing>
@@ -17069,6 +17070,1562 @@
     <p:extLst>
       <p:ext uri="{BB962C8B-B14F-4D97-AF65-F5344CB8AC3E}">
         <p14:creationId xmlns:p14="http://schemas.microsoft.com/office/powerpoint/2010/main" val="612918260"/>
+      </p:ext>
+    </p:extLst>
+  </p:cSld>
+  <p:clrMapOvr>
+    <a:masterClrMapping/>
+  </p:clrMapOvr>
+</p:sld>
+</file>
+
+<file path=ppt/slides/slide9.xml><?xml version="1.0" encoding="utf-8"?>
+<p:sld xmlns:a="http://schemas.openxmlformats.org/drawingml/2006/main" xmlns:r="http://schemas.openxmlformats.org/officeDocument/2006/relationships" xmlns:p="http://schemas.openxmlformats.org/presentationml/2006/main">
+  <p:cSld>
+    <p:spTree>
+      <p:nvGrpSpPr>
+        <p:cNvPr id="1" name=""/>
+        <p:cNvGrpSpPr/>
+        <p:nvPr/>
+      </p:nvGrpSpPr>
+      <p:grpSpPr>
+        <a:xfrm>
+          <a:off x="0" y="0"/>
+          <a:ext cx="0" cy="0"/>
+          <a:chOff x="0" y="0"/>
+          <a:chExt cx="0" cy="0"/>
+        </a:xfrm>
+      </p:grpSpPr>
+      <p:sp>
+        <p:nvSpPr>
+          <p:cNvPr id="34" name="TextBox 33"/>
+          <p:cNvSpPr txBox="1"/>
+          <p:nvPr/>
+        </p:nvSpPr>
+        <p:spPr>
+          <a:xfrm>
+            <a:off x="1903096" y="2194994"/>
+            <a:ext cx="742511" cy="369332"/>
+          </a:xfrm>
+          <a:prstGeom prst="rect">
+            <a:avLst/>
+          </a:prstGeom>
+          <a:noFill/>
+        </p:spPr>
+        <p:txBody>
+          <a:bodyPr wrap="none" rtlCol="0">
+            <a:spAutoFit/>
+          </a:bodyPr>
+          <a:lstStyle/>
+          <a:p>
+            <a:pPr algn="r"/>
+            <a:r>
+              <a:rPr lang="en-US" dirty="0" smtClean="0">
+                <a:solidFill>
+                  <a:schemeClr val="bg1">
+                    <a:lumMod val="50000"/>
+                  </a:schemeClr>
+                </a:solidFill>
+                <a:latin typeface="Gill Sans"/>
+                <a:cs typeface="Gill Sans"/>
+              </a:rPr>
+              <a:t>tuples</a:t>
+            </a:r>
+          </a:p>
+        </p:txBody>
+      </p:sp>
+      <p:sp>
+        <p:nvSpPr>
+          <p:cNvPr id="35" name="TextBox 34"/>
+          <p:cNvSpPr txBox="1"/>
+          <p:nvPr/>
+        </p:nvSpPr>
+        <p:spPr>
+          <a:xfrm>
+            <a:off x="2018704" y="2414343"/>
+            <a:ext cx="626903" cy="369332"/>
+          </a:xfrm>
+          <a:prstGeom prst="rect">
+            <a:avLst/>
+          </a:prstGeom>
+          <a:noFill/>
+        </p:spPr>
+        <p:txBody>
+          <a:bodyPr wrap="none" rtlCol="0">
+            <a:spAutoFit/>
+          </a:bodyPr>
+          <a:lstStyle/>
+          <a:p>
+            <a:r>
+              <a:rPr lang="en-US" dirty="0" smtClean="0">
+                <a:solidFill>
+                  <a:srgbClr val="FF0000"/>
+                </a:solidFill>
+                <a:latin typeface="Gill Sans"/>
+                <a:cs typeface="Gill Sans"/>
+              </a:rPr>
+              <a:t>dirty</a:t>
+            </a:r>
+          </a:p>
+        </p:txBody>
+      </p:sp>
+      <p:sp>
+        <p:nvSpPr>
+          <p:cNvPr id="36" name="TextBox 35"/>
+          <p:cNvSpPr txBox="1"/>
+          <p:nvPr/>
+        </p:nvSpPr>
+        <p:spPr>
+          <a:xfrm>
+            <a:off x="1984849" y="2634288"/>
+            <a:ext cx="660758" cy="369332"/>
+          </a:xfrm>
+          <a:prstGeom prst="rect">
+            <a:avLst/>
+          </a:prstGeom>
+          <a:noFill/>
+        </p:spPr>
+        <p:txBody>
+          <a:bodyPr wrap="none" rtlCol="0">
+            <a:spAutoFit/>
+          </a:bodyPr>
+          <a:lstStyle/>
+          <a:p>
+            <a:r>
+              <a:rPr lang="en-US" dirty="0" smtClean="0">
+                <a:solidFill>
+                  <a:schemeClr val="accent5"/>
+                </a:solidFill>
+                <a:latin typeface="Gill Sans"/>
+                <a:cs typeface="Gill Sans"/>
+              </a:rPr>
+              <a:t>truth</a:t>
+            </a:r>
+          </a:p>
+        </p:txBody>
+      </p:sp>
+      <p:sp>
+        <p:nvSpPr>
+          <p:cNvPr id="37" name="TextBox 36"/>
+          <p:cNvSpPr txBox="1"/>
+          <p:nvPr/>
+        </p:nvSpPr>
+        <p:spPr>
+          <a:xfrm>
+            <a:off x="1907713" y="2857769"/>
+            <a:ext cx="737894" cy="369332"/>
+          </a:xfrm>
+          <a:prstGeom prst="rect">
+            <a:avLst/>
+          </a:prstGeom>
+          <a:noFill/>
+        </p:spPr>
+        <p:txBody>
+          <a:bodyPr wrap="none" rtlCol="0">
+            <a:spAutoFit/>
+          </a:bodyPr>
+          <a:lstStyle/>
+          <a:p>
+            <a:pPr algn="r"/>
+            <a:r>
+              <a:rPr lang="en-US" dirty="0" smtClean="0">
+                <a:solidFill>
+                  <a:schemeClr val="accent6"/>
+                </a:solidFill>
+                <a:latin typeface="Gill Sans"/>
+                <a:cs typeface="Gill Sans"/>
+              </a:rPr>
+              <a:t>repair</a:t>
+            </a:r>
+          </a:p>
+        </p:txBody>
+      </p:sp>
+      <p:sp>
+        <p:nvSpPr>
+          <p:cNvPr id="4" name="TextBox 3"/>
+          <p:cNvSpPr txBox="1"/>
+          <p:nvPr/>
+        </p:nvSpPr>
+        <p:spPr>
+          <a:xfrm>
+            <a:off x="3197766" y="1820649"/>
+            <a:ext cx="1186543" cy="369332"/>
+          </a:xfrm>
+          <a:prstGeom prst="rect">
+            <a:avLst/>
+          </a:prstGeom>
+          <a:noFill/>
+        </p:spPr>
+        <p:txBody>
+          <a:bodyPr wrap="none" rtlCol="0">
+            <a:spAutoFit/>
+          </a:bodyPr>
+          <a:lstStyle/>
+          <a:p>
+            <a:r>
+              <a:rPr lang="en-US" dirty="0" smtClean="0">
+                <a:latin typeface="Gill Sans"/>
+                <a:cs typeface="Gill Sans"/>
+              </a:rPr>
+              <a:t>complaints</a:t>
+            </a:r>
+          </a:p>
+        </p:txBody>
+      </p:sp>
+      <p:sp>
+        <p:nvSpPr>
+          <p:cNvPr id="5" name="TextBox 4"/>
+          <p:cNvSpPr txBox="1"/>
+          <p:nvPr/>
+        </p:nvSpPr>
+        <p:spPr>
+          <a:xfrm>
+            <a:off x="4911465" y="1820649"/>
+            <a:ext cx="1619354" cy="369332"/>
+          </a:xfrm>
+          <a:prstGeom prst="rect">
+            <a:avLst/>
+          </a:prstGeom>
+          <a:noFill/>
+        </p:spPr>
+        <p:txBody>
+          <a:bodyPr wrap="none" rtlCol="0">
+            <a:spAutoFit/>
+          </a:bodyPr>
+          <a:lstStyle/>
+          <a:p>
+            <a:r>
+              <a:rPr lang="en-US" dirty="0" smtClean="0">
+                <a:latin typeface="Gill Sans"/>
+                <a:cs typeface="Gill Sans"/>
+              </a:rPr>
+              <a:t>non-complaints</a:t>
+            </a:r>
+          </a:p>
+        </p:txBody>
+      </p:sp>
+      <p:sp>
+        <p:nvSpPr>
+          <p:cNvPr id="71" name="Oval 70"/>
+          <p:cNvSpPr/>
+          <p:nvPr/>
+        </p:nvSpPr>
+        <p:spPr>
+          <a:xfrm>
+            <a:off x="2971523" y="1893773"/>
+            <a:ext cx="223084" cy="223084"/>
+          </a:xfrm>
+          <a:prstGeom prst="ellipse">
+            <a:avLst/>
+          </a:prstGeom>
+          <a:solidFill>
+            <a:schemeClr val="bg1">
+              <a:lumMod val="50000"/>
+            </a:schemeClr>
+          </a:solidFill>
+          <a:ln>
+            <a:noFill/>
+          </a:ln>
+          <a:effectLst/>
+        </p:spPr>
+        <p:style>
+          <a:lnRef idx="1">
+            <a:schemeClr val="accent1"/>
+          </a:lnRef>
+          <a:fillRef idx="3">
+            <a:schemeClr val="accent1"/>
+          </a:fillRef>
+          <a:effectRef idx="2">
+            <a:schemeClr val="accent1"/>
+          </a:effectRef>
+          <a:fontRef idx="minor">
+            <a:schemeClr val="lt1"/>
+          </a:fontRef>
+        </p:style>
+        <p:txBody>
+          <a:bodyPr rtlCol="0" anchor="ctr"/>
+          <a:lstStyle/>
+          <a:p>
+            <a:pPr algn="ctr"/>
+            <a:endParaRPr lang="en-US"/>
+          </a:p>
+        </p:txBody>
+      </p:sp>
+      <p:sp>
+        <p:nvSpPr>
+          <p:cNvPr id="72" name="Oval 71"/>
+          <p:cNvSpPr/>
+          <p:nvPr/>
+        </p:nvSpPr>
+        <p:spPr>
+          <a:xfrm>
+            <a:off x="4684618" y="1893773"/>
+            <a:ext cx="223084" cy="223084"/>
+          </a:xfrm>
+          <a:prstGeom prst="ellipse">
+            <a:avLst/>
+          </a:prstGeom>
+          <a:solidFill>
+            <a:schemeClr val="bg1"/>
+          </a:solidFill>
+          <a:ln w="28575">
+            <a:solidFill>
+              <a:schemeClr val="bg1">
+                <a:lumMod val="50000"/>
+              </a:schemeClr>
+            </a:solidFill>
+          </a:ln>
+          <a:effectLst/>
+        </p:spPr>
+        <p:style>
+          <a:lnRef idx="1">
+            <a:schemeClr val="accent1"/>
+          </a:lnRef>
+          <a:fillRef idx="3">
+            <a:schemeClr val="accent1"/>
+          </a:fillRef>
+          <a:effectRef idx="2">
+            <a:schemeClr val="accent1"/>
+          </a:effectRef>
+          <a:fontRef idx="minor">
+            <a:schemeClr val="lt1"/>
+          </a:fontRef>
+        </p:style>
+        <p:txBody>
+          <a:bodyPr rtlCol="0" anchor="ctr"/>
+          <a:lstStyle/>
+          <a:p>
+            <a:pPr algn="ctr"/>
+            <a:endParaRPr lang="en-US" dirty="0"/>
+          </a:p>
+        </p:txBody>
+      </p:sp>
+      <p:sp>
+        <p:nvSpPr>
+          <p:cNvPr id="48" name="TextBox 47"/>
+          <p:cNvSpPr txBox="1"/>
+          <p:nvPr/>
+        </p:nvSpPr>
+        <p:spPr>
+          <a:xfrm>
+            <a:off x="5557277" y="3085705"/>
+            <a:ext cx="530915" cy="461665"/>
+          </a:xfrm>
+          <a:prstGeom prst="rect">
+            <a:avLst/>
+          </a:prstGeom>
+          <a:noFill/>
+        </p:spPr>
+        <p:txBody>
+          <a:bodyPr wrap="none" rtlCol="0">
+            <a:spAutoFit/>
+          </a:bodyPr>
+          <a:lstStyle/>
+          <a:p>
+            <a:r>
+              <a:rPr lang="en-US" sz="2400" dirty="0" smtClean="0">
+                <a:latin typeface="Alegreya" charset="0"/>
+                <a:ea typeface="Alegreya" charset="0"/>
+                <a:cs typeface="Alegreya" charset="0"/>
+              </a:rPr>
+              <a:t>(b)</a:t>
+            </a:r>
+          </a:p>
+        </p:txBody>
+      </p:sp>
+      <p:sp>
+        <p:nvSpPr>
+          <p:cNvPr id="49" name="TextBox 48"/>
+          <p:cNvSpPr txBox="1"/>
+          <p:nvPr/>
+        </p:nvSpPr>
+        <p:spPr>
+          <a:xfrm>
+            <a:off x="3421365" y="3085705"/>
+            <a:ext cx="516488" cy="461665"/>
+          </a:xfrm>
+          <a:prstGeom prst="rect">
+            <a:avLst/>
+          </a:prstGeom>
+          <a:noFill/>
+        </p:spPr>
+        <p:txBody>
+          <a:bodyPr wrap="none" rtlCol="0">
+            <a:spAutoFit/>
+          </a:bodyPr>
+          <a:lstStyle/>
+          <a:p>
+            <a:r>
+              <a:rPr lang="en-US" sz="2400" dirty="0" smtClean="0">
+                <a:latin typeface="Alegreya" charset="0"/>
+                <a:ea typeface="Alegreya" charset="0"/>
+                <a:cs typeface="Alegreya" charset="0"/>
+              </a:rPr>
+              <a:t>(a)</a:t>
+            </a:r>
+          </a:p>
+        </p:txBody>
+      </p:sp>
+      <p:grpSp>
+        <p:nvGrpSpPr>
+          <p:cNvPr id="95" name="Group 94"/>
+          <p:cNvGrpSpPr/>
+          <p:nvPr/>
+        </p:nvGrpSpPr>
+        <p:grpSpPr>
+          <a:xfrm>
+            <a:off x="4848729" y="2349125"/>
+            <a:ext cx="1948010" cy="717005"/>
+            <a:chOff x="4848729" y="2349125"/>
+            <a:chExt cx="1948010" cy="717005"/>
+          </a:xfrm>
+        </p:grpSpPr>
+        <p:cxnSp>
+          <p:nvCxnSpPr>
+            <p:cNvPr id="87" name="Straight Connector 86"/>
+            <p:cNvCxnSpPr/>
+            <p:nvPr/>
+          </p:nvCxnSpPr>
+          <p:spPr>
+            <a:xfrm>
+              <a:off x="4848729" y="2406295"/>
+              <a:ext cx="1933839" cy="623"/>
+            </a:xfrm>
+            <a:prstGeom prst="line">
+              <a:avLst/>
+            </a:prstGeom>
+            <a:ln>
+              <a:solidFill>
+                <a:schemeClr val="bg1">
+                  <a:lumMod val="75000"/>
+                </a:schemeClr>
+              </a:solidFill>
+              <a:prstDash val="sysDot"/>
+              <a:headEnd type="none" w="med" len="med"/>
+              <a:tailEnd type="none" w="med" len="med"/>
+            </a:ln>
+            <a:effectLst/>
+          </p:spPr>
+          <p:style>
+            <a:lnRef idx="2">
+              <a:schemeClr val="accent1"/>
+            </a:lnRef>
+            <a:fillRef idx="0">
+              <a:schemeClr val="accent1"/>
+            </a:fillRef>
+            <a:effectRef idx="1">
+              <a:schemeClr val="accent1"/>
+            </a:effectRef>
+            <a:fontRef idx="minor">
+              <a:schemeClr val="tx1"/>
+            </a:fontRef>
+          </p:style>
+        </p:cxnSp>
+        <p:cxnSp>
+          <p:nvCxnSpPr>
+            <p:cNvPr id="88" name="Straight Connector 87"/>
+            <p:cNvCxnSpPr/>
+            <p:nvPr/>
+          </p:nvCxnSpPr>
+          <p:spPr>
+            <a:xfrm>
+              <a:off x="4862900" y="2629776"/>
+              <a:ext cx="1933839" cy="1762"/>
+            </a:xfrm>
+            <a:prstGeom prst="line">
+              <a:avLst/>
+            </a:prstGeom>
+            <a:ln>
+              <a:solidFill>
+                <a:schemeClr val="bg1">
+                  <a:lumMod val="75000"/>
+                </a:schemeClr>
+              </a:solidFill>
+              <a:prstDash val="sysDot"/>
+              <a:headEnd type="none" w="med" len="med"/>
+              <a:tailEnd type="none" w="med" len="med"/>
+            </a:ln>
+            <a:effectLst/>
+          </p:spPr>
+          <p:style>
+            <a:lnRef idx="2">
+              <a:schemeClr val="accent1"/>
+            </a:lnRef>
+            <a:fillRef idx="0">
+              <a:schemeClr val="accent1"/>
+            </a:fillRef>
+            <a:effectRef idx="1">
+              <a:schemeClr val="accent1"/>
+            </a:effectRef>
+            <a:fontRef idx="minor">
+              <a:schemeClr val="tx1"/>
+            </a:fontRef>
+          </p:style>
+        </p:cxnSp>
+        <p:cxnSp>
+          <p:nvCxnSpPr>
+            <p:cNvPr id="89" name="Straight Connector 88"/>
+            <p:cNvCxnSpPr/>
+            <p:nvPr/>
+          </p:nvCxnSpPr>
+          <p:spPr>
+            <a:xfrm flipV="1">
+              <a:off x="4862900" y="2843435"/>
+              <a:ext cx="1933839" cy="4916"/>
+            </a:xfrm>
+            <a:prstGeom prst="line">
+              <a:avLst/>
+            </a:prstGeom>
+            <a:ln>
+              <a:solidFill>
+                <a:schemeClr val="bg1">
+                  <a:lumMod val="75000"/>
+                </a:schemeClr>
+              </a:solidFill>
+              <a:prstDash val="sysDot"/>
+              <a:headEnd type="none" w="med" len="med"/>
+              <a:tailEnd type="none" w="med" len="med"/>
+            </a:ln>
+            <a:effectLst/>
+          </p:spPr>
+          <p:style>
+            <a:lnRef idx="2">
+              <a:schemeClr val="accent1"/>
+            </a:lnRef>
+            <a:fillRef idx="0">
+              <a:schemeClr val="accent1"/>
+            </a:fillRef>
+            <a:effectRef idx="1">
+              <a:schemeClr val="accent1"/>
+            </a:effectRef>
+            <a:fontRef idx="minor">
+              <a:schemeClr val="tx1"/>
+            </a:fontRef>
+          </p:style>
+        </p:cxnSp>
+        <p:cxnSp>
+          <p:nvCxnSpPr>
+            <p:cNvPr id="90" name="Straight Connector 89"/>
+            <p:cNvCxnSpPr/>
+            <p:nvPr/>
+          </p:nvCxnSpPr>
+          <p:spPr>
+            <a:xfrm flipV="1">
+              <a:off x="4862900" y="3063380"/>
+              <a:ext cx="1933839" cy="2750"/>
+            </a:xfrm>
+            <a:prstGeom prst="line">
+              <a:avLst/>
+            </a:prstGeom>
+            <a:ln>
+              <a:solidFill>
+                <a:schemeClr val="bg1">
+                  <a:lumMod val="75000"/>
+                </a:schemeClr>
+              </a:solidFill>
+              <a:prstDash val="sysDot"/>
+              <a:headEnd type="none" w="med" len="med"/>
+              <a:tailEnd type="none" w="med" len="med"/>
+            </a:ln>
+            <a:effectLst/>
+          </p:spPr>
+          <p:style>
+            <a:lnRef idx="2">
+              <a:schemeClr val="accent1"/>
+            </a:lnRef>
+            <a:fillRef idx="0">
+              <a:schemeClr val="accent1"/>
+            </a:fillRef>
+            <a:effectRef idx="1">
+              <a:schemeClr val="accent1"/>
+            </a:effectRef>
+            <a:fontRef idx="minor">
+              <a:schemeClr val="tx1"/>
+            </a:fontRef>
+          </p:style>
+        </p:cxnSp>
+        <p:cxnSp>
+          <p:nvCxnSpPr>
+            <p:cNvPr id="10" name="Straight Connector 9"/>
+            <p:cNvCxnSpPr/>
+            <p:nvPr/>
+          </p:nvCxnSpPr>
+          <p:spPr>
+            <a:xfrm>
+              <a:off x="4964888" y="2626240"/>
+              <a:ext cx="514424" cy="0"/>
+            </a:xfrm>
+            <a:prstGeom prst="line">
+              <a:avLst/>
+            </a:prstGeom>
+            <a:ln w="57150">
+              <a:solidFill>
+                <a:srgbClr val="FF0000"/>
+              </a:solidFill>
+              <a:headEnd type="none" w="med" len="med"/>
+              <a:tailEnd type="none" w="med" len="med"/>
+            </a:ln>
+            <a:effectLst/>
+          </p:spPr>
+          <p:style>
+            <a:lnRef idx="2">
+              <a:schemeClr val="accent1"/>
+            </a:lnRef>
+            <a:fillRef idx="0">
+              <a:schemeClr val="accent1"/>
+            </a:fillRef>
+            <a:effectRef idx="1">
+              <a:schemeClr val="accent1"/>
+            </a:effectRef>
+            <a:fontRef idx="minor">
+              <a:schemeClr val="tx1"/>
+            </a:fontRef>
+          </p:style>
+        </p:cxnSp>
+        <p:cxnSp>
+          <p:nvCxnSpPr>
+            <p:cNvPr id="12" name="Straight Connector 11"/>
+            <p:cNvCxnSpPr/>
+            <p:nvPr/>
+          </p:nvCxnSpPr>
+          <p:spPr>
+            <a:xfrm>
+              <a:off x="5815798" y="2846185"/>
+              <a:ext cx="894031" cy="0"/>
+            </a:xfrm>
+            <a:prstGeom prst="line">
+              <a:avLst/>
+            </a:prstGeom>
+            <a:ln w="57150">
+              <a:solidFill>
+                <a:schemeClr val="accent5"/>
+              </a:solidFill>
+              <a:headEnd type="none" w="med" len="med"/>
+              <a:tailEnd type="none" w="med" len="med"/>
+            </a:ln>
+            <a:effectLst/>
+          </p:spPr>
+          <p:style>
+            <a:lnRef idx="2">
+              <a:schemeClr val="accent1"/>
+            </a:lnRef>
+            <a:fillRef idx="0">
+              <a:schemeClr val="accent1"/>
+            </a:fillRef>
+            <a:effectRef idx="1">
+              <a:schemeClr val="accent1"/>
+            </a:effectRef>
+            <a:fontRef idx="minor">
+              <a:schemeClr val="tx1"/>
+            </a:fontRef>
+          </p:style>
+        </p:cxnSp>
+        <p:cxnSp>
+          <p:nvCxnSpPr>
+            <p:cNvPr id="13" name="Straight Connector 12"/>
+            <p:cNvCxnSpPr/>
+            <p:nvPr/>
+          </p:nvCxnSpPr>
+          <p:spPr>
+            <a:xfrm flipV="1">
+              <a:off x="5520205" y="3063380"/>
+              <a:ext cx="1189624" cy="2750"/>
+            </a:xfrm>
+            <a:prstGeom prst="line">
+              <a:avLst/>
+            </a:prstGeom>
+            <a:ln w="57150">
+              <a:solidFill>
+                <a:schemeClr val="accent6"/>
+              </a:solidFill>
+              <a:headEnd type="none" w="med" len="med"/>
+              <a:tailEnd type="none" w="med" len="med"/>
+            </a:ln>
+            <a:effectLst/>
+          </p:spPr>
+          <p:style>
+            <a:lnRef idx="2">
+              <a:schemeClr val="accent1"/>
+            </a:lnRef>
+            <a:fillRef idx="0">
+              <a:schemeClr val="accent1"/>
+            </a:fillRef>
+            <a:effectRef idx="1">
+              <a:schemeClr val="accent1"/>
+            </a:effectRef>
+            <a:fontRef idx="minor">
+              <a:schemeClr val="tx1"/>
+            </a:fontRef>
+          </p:style>
+        </p:cxnSp>
+        <p:sp>
+          <p:nvSpPr>
+            <p:cNvPr id="57" name="Oval 56"/>
+            <p:cNvSpPr/>
+            <p:nvPr/>
+          </p:nvSpPr>
+          <p:spPr>
+            <a:xfrm>
+              <a:off x="5035253" y="2349125"/>
+              <a:ext cx="120660" cy="120660"/>
+            </a:xfrm>
+            <a:prstGeom prst="ellipse">
+              <a:avLst/>
+            </a:prstGeom>
+            <a:solidFill>
+              <a:schemeClr val="bg1">
+                <a:lumMod val="50000"/>
+              </a:schemeClr>
+            </a:solidFill>
+            <a:ln>
+              <a:noFill/>
+            </a:ln>
+            <a:effectLst/>
+          </p:spPr>
+          <p:style>
+            <a:lnRef idx="1">
+              <a:schemeClr val="accent1"/>
+            </a:lnRef>
+            <a:fillRef idx="3">
+              <a:schemeClr val="accent1"/>
+            </a:fillRef>
+            <a:effectRef idx="2">
+              <a:schemeClr val="accent1"/>
+            </a:effectRef>
+            <a:fontRef idx="minor">
+              <a:schemeClr val="lt1"/>
+            </a:fontRef>
+          </p:style>
+          <p:txBody>
+            <a:bodyPr rtlCol="0" anchor="ctr"/>
+            <a:lstStyle/>
+            <a:p>
+              <a:pPr algn="ctr"/>
+              <a:endParaRPr lang="en-US"/>
+            </a:p>
+          </p:txBody>
+        </p:sp>
+        <p:sp>
+          <p:nvSpPr>
+            <p:cNvPr id="59" name="Oval 58"/>
+            <p:cNvSpPr/>
+            <p:nvPr/>
+          </p:nvSpPr>
+          <p:spPr>
+            <a:xfrm>
+              <a:off x="5302099" y="2349125"/>
+              <a:ext cx="120660" cy="120660"/>
+            </a:xfrm>
+            <a:prstGeom prst="ellipse">
+              <a:avLst/>
+            </a:prstGeom>
+            <a:solidFill>
+              <a:schemeClr val="bg1">
+                <a:lumMod val="50000"/>
+              </a:schemeClr>
+            </a:solidFill>
+            <a:ln>
+              <a:noFill/>
+            </a:ln>
+            <a:effectLst/>
+          </p:spPr>
+          <p:style>
+            <a:lnRef idx="1">
+              <a:schemeClr val="accent1"/>
+            </a:lnRef>
+            <a:fillRef idx="3">
+              <a:schemeClr val="accent1"/>
+            </a:fillRef>
+            <a:effectRef idx="2">
+              <a:schemeClr val="accent1"/>
+            </a:effectRef>
+            <a:fontRef idx="minor">
+              <a:schemeClr val="lt1"/>
+            </a:fontRef>
+          </p:style>
+          <p:txBody>
+            <a:bodyPr rtlCol="0" anchor="ctr"/>
+            <a:lstStyle/>
+            <a:p>
+              <a:pPr algn="ctr"/>
+              <a:endParaRPr lang="en-US"/>
+            </a:p>
+          </p:txBody>
+        </p:sp>
+        <p:sp>
+          <p:nvSpPr>
+            <p:cNvPr id="61" name="Oval 60"/>
+            <p:cNvSpPr/>
+            <p:nvPr/>
+          </p:nvSpPr>
+          <p:spPr>
+            <a:xfrm>
+              <a:off x="5884792" y="2349125"/>
+              <a:ext cx="120660" cy="120660"/>
+            </a:xfrm>
+            <a:prstGeom prst="ellipse">
+              <a:avLst/>
+            </a:prstGeom>
+            <a:solidFill>
+              <a:schemeClr val="bg1">
+                <a:lumMod val="50000"/>
+              </a:schemeClr>
+            </a:solidFill>
+            <a:ln>
+              <a:noFill/>
+            </a:ln>
+            <a:effectLst/>
+          </p:spPr>
+          <p:style>
+            <a:lnRef idx="1">
+              <a:schemeClr val="accent1"/>
+            </a:lnRef>
+            <a:fillRef idx="3">
+              <a:schemeClr val="accent1"/>
+            </a:fillRef>
+            <a:effectRef idx="2">
+              <a:schemeClr val="accent1"/>
+            </a:effectRef>
+            <a:fontRef idx="minor">
+              <a:schemeClr val="lt1"/>
+            </a:fontRef>
+          </p:style>
+          <p:txBody>
+            <a:bodyPr rtlCol="0" anchor="ctr"/>
+            <a:lstStyle/>
+            <a:p>
+              <a:pPr algn="ctr"/>
+              <a:endParaRPr lang="en-US"/>
+            </a:p>
+          </p:txBody>
+        </p:sp>
+        <p:sp>
+          <p:nvSpPr>
+            <p:cNvPr id="63" name="Oval 62"/>
+            <p:cNvSpPr/>
+            <p:nvPr/>
+          </p:nvSpPr>
+          <p:spPr>
+            <a:xfrm>
+              <a:off x="6213649" y="2349125"/>
+              <a:ext cx="120660" cy="120660"/>
+            </a:xfrm>
+            <a:prstGeom prst="ellipse">
+              <a:avLst/>
+            </a:prstGeom>
+            <a:solidFill>
+              <a:schemeClr val="bg1">
+                <a:lumMod val="50000"/>
+              </a:schemeClr>
+            </a:solidFill>
+            <a:ln>
+              <a:noFill/>
+            </a:ln>
+            <a:effectLst/>
+          </p:spPr>
+          <p:style>
+            <a:lnRef idx="1">
+              <a:schemeClr val="accent1"/>
+            </a:lnRef>
+            <a:fillRef idx="3">
+              <a:schemeClr val="accent1"/>
+            </a:fillRef>
+            <a:effectRef idx="2">
+              <a:schemeClr val="accent1"/>
+            </a:effectRef>
+            <a:fontRef idx="minor">
+              <a:schemeClr val="lt1"/>
+            </a:fontRef>
+          </p:style>
+          <p:txBody>
+            <a:bodyPr rtlCol="0" anchor="ctr"/>
+            <a:lstStyle/>
+            <a:p>
+              <a:pPr algn="ctr"/>
+              <a:endParaRPr lang="en-US"/>
+            </a:p>
+          </p:txBody>
+        </p:sp>
+        <p:sp>
+          <p:nvSpPr>
+            <p:cNvPr id="64" name="Oval 63"/>
+            <p:cNvSpPr/>
+            <p:nvPr/>
+          </p:nvSpPr>
+          <p:spPr>
+            <a:xfrm>
+              <a:off x="6561756" y="2349125"/>
+              <a:ext cx="120660" cy="120660"/>
+            </a:xfrm>
+            <a:prstGeom prst="ellipse">
+              <a:avLst/>
+            </a:prstGeom>
+            <a:solidFill>
+              <a:schemeClr val="bg1">
+                <a:lumMod val="50000"/>
+              </a:schemeClr>
+            </a:solidFill>
+            <a:ln>
+              <a:noFill/>
+            </a:ln>
+            <a:effectLst/>
+          </p:spPr>
+          <p:style>
+            <a:lnRef idx="1">
+              <a:schemeClr val="accent1"/>
+            </a:lnRef>
+            <a:fillRef idx="3">
+              <a:schemeClr val="accent1"/>
+            </a:fillRef>
+            <a:effectRef idx="2">
+              <a:schemeClr val="accent1"/>
+            </a:effectRef>
+            <a:fontRef idx="minor">
+              <a:schemeClr val="lt1"/>
+            </a:fontRef>
+          </p:style>
+          <p:txBody>
+            <a:bodyPr rtlCol="0" anchor="ctr"/>
+            <a:lstStyle/>
+            <a:p>
+              <a:pPr algn="ctr"/>
+              <a:endParaRPr lang="en-US"/>
+            </a:p>
+          </p:txBody>
+        </p:sp>
+        <p:sp>
+          <p:nvSpPr>
+            <p:cNvPr id="70" name="Oval 69"/>
+            <p:cNvSpPr/>
+            <p:nvPr/>
+          </p:nvSpPr>
+          <p:spPr>
+            <a:xfrm>
+              <a:off x="5568207" y="2349125"/>
+              <a:ext cx="120660" cy="120660"/>
+            </a:xfrm>
+            <a:prstGeom prst="ellipse">
+              <a:avLst/>
+            </a:prstGeom>
+            <a:solidFill>
+              <a:schemeClr val="bg1"/>
+            </a:solidFill>
+            <a:ln w="28575">
+              <a:solidFill>
+                <a:schemeClr val="bg1">
+                  <a:lumMod val="50000"/>
+                </a:schemeClr>
+              </a:solidFill>
+            </a:ln>
+            <a:effectLst/>
+          </p:spPr>
+          <p:style>
+            <a:lnRef idx="1">
+              <a:schemeClr val="accent1"/>
+            </a:lnRef>
+            <a:fillRef idx="3">
+              <a:schemeClr val="accent1"/>
+            </a:fillRef>
+            <a:effectRef idx="2">
+              <a:schemeClr val="accent1"/>
+            </a:effectRef>
+            <a:fontRef idx="minor">
+              <a:schemeClr val="lt1"/>
+            </a:fontRef>
+          </p:style>
+          <p:txBody>
+            <a:bodyPr rtlCol="0" anchor="ctr"/>
+            <a:lstStyle/>
+            <a:p>
+              <a:pPr algn="ctr"/>
+              <a:endParaRPr lang="en-US"/>
+            </a:p>
+          </p:txBody>
+        </p:sp>
+      </p:grpSp>
+      <p:grpSp>
+        <p:nvGrpSpPr>
+          <p:cNvPr id="96" name="Group 95"/>
+          <p:cNvGrpSpPr/>
+          <p:nvPr/>
+        </p:nvGrpSpPr>
+        <p:grpSpPr>
+          <a:xfrm>
+            <a:off x="2705604" y="2349338"/>
+            <a:ext cx="1948010" cy="719542"/>
+            <a:chOff x="2705604" y="2349338"/>
+            <a:chExt cx="1948010" cy="719542"/>
+          </a:xfrm>
+        </p:grpSpPr>
+        <p:cxnSp>
+          <p:nvCxnSpPr>
+            <p:cNvPr id="43" name="Straight Connector 42"/>
+            <p:cNvCxnSpPr/>
+            <p:nvPr/>
+          </p:nvCxnSpPr>
+          <p:spPr>
+            <a:xfrm>
+              <a:off x="2705604" y="2409045"/>
+              <a:ext cx="1933839" cy="623"/>
+            </a:xfrm>
+            <a:prstGeom prst="line">
+              <a:avLst/>
+            </a:prstGeom>
+            <a:ln>
+              <a:solidFill>
+                <a:schemeClr val="bg1">
+                  <a:lumMod val="75000"/>
+                </a:schemeClr>
+              </a:solidFill>
+              <a:prstDash val="sysDot"/>
+              <a:headEnd type="none" w="med" len="med"/>
+              <a:tailEnd type="none" w="med" len="med"/>
+            </a:ln>
+            <a:effectLst/>
+          </p:spPr>
+          <p:style>
+            <a:lnRef idx="2">
+              <a:schemeClr val="accent1"/>
+            </a:lnRef>
+            <a:fillRef idx="0">
+              <a:schemeClr val="accent1"/>
+            </a:fillRef>
+            <a:effectRef idx="1">
+              <a:schemeClr val="accent1"/>
+            </a:effectRef>
+            <a:fontRef idx="minor">
+              <a:schemeClr val="tx1"/>
+            </a:fontRef>
+          </p:style>
+        </p:cxnSp>
+        <p:cxnSp>
+          <p:nvCxnSpPr>
+            <p:cNvPr id="44" name="Straight Connector 43"/>
+            <p:cNvCxnSpPr/>
+            <p:nvPr/>
+          </p:nvCxnSpPr>
+          <p:spPr>
+            <a:xfrm>
+              <a:off x="2719775" y="2632526"/>
+              <a:ext cx="1933839" cy="1762"/>
+            </a:xfrm>
+            <a:prstGeom prst="line">
+              <a:avLst/>
+            </a:prstGeom>
+            <a:ln>
+              <a:solidFill>
+                <a:schemeClr val="bg1">
+                  <a:lumMod val="75000"/>
+                </a:schemeClr>
+              </a:solidFill>
+              <a:prstDash val="sysDot"/>
+              <a:headEnd type="none" w="med" len="med"/>
+              <a:tailEnd type="none" w="med" len="med"/>
+            </a:ln>
+            <a:effectLst/>
+          </p:spPr>
+          <p:style>
+            <a:lnRef idx="2">
+              <a:schemeClr val="accent1"/>
+            </a:lnRef>
+            <a:fillRef idx="0">
+              <a:schemeClr val="accent1"/>
+            </a:fillRef>
+            <a:effectRef idx="1">
+              <a:schemeClr val="accent1"/>
+            </a:effectRef>
+            <a:fontRef idx="minor">
+              <a:schemeClr val="tx1"/>
+            </a:fontRef>
+          </p:style>
+        </p:cxnSp>
+        <p:cxnSp>
+          <p:nvCxnSpPr>
+            <p:cNvPr id="45" name="Straight Connector 44"/>
+            <p:cNvCxnSpPr/>
+            <p:nvPr/>
+          </p:nvCxnSpPr>
+          <p:spPr>
+            <a:xfrm flipV="1">
+              <a:off x="2719775" y="2846185"/>
+              <a:ext cx="1933839" cy="4916"/>
+            </a:xfrm>
+            <a:prstGeom prst="line">
+              <a:avLst/>
+            </a:prstGeom>
+            <a:ln>
+              <a:solidFill>
+                <a:schemeClr val="bg1">
+                  <a:lumMod val="75000"/>
+                </a:schemeClr>
+              </a:solidFill>
+              <a:prstDash val="sysDot"/>
+              <a:headEnd type="none" w="med" len="med"/>
+              <a:tailEnd type="none" w="med" len="med"/>
+            </a:ln>
+            <a:effectLst/>
+          </p:spPr>
+          <p:style>
+            <a:lnRef idx="2">
+              <a:schemeClr val="accent1"/>
+            </a:lnRef>
+            <a:fillRef idx="0">
+              <a:schemeClr val="accent1"/>
+            </a:fillRef>
+            <a:effectRef idx="1">
+              <a:schemeClr val="accent1"/>
+            </a:effectRef>
+            <a:fontRef idx="minor">
+              <a:schemeClr val="tx1"/>
+            </a:fontRef>
+          </p:style>
+        </p:cxnSp>
+        <p:cxnSp>
+          <p:nvCxnSpPr>
+            <p:cNvPr id="46" name="Straight Connector 45"/>
+            <p:cNvCxnSpPr/>
+            <p:nvPr/>
+          </p:nvCxnSpPr>
+          <p:spPr>
+            <a:xfrm flipV="1">
+              <a:off x="2719775" y="3066130"/>
+              <a:ext cx="1933839" cy="2750"/>
+            </a:xfrm>
+            <a:prstGeom prst="line">
+              <a:avLst/>
+            </a:prstGeom>
+            <a:ln>
+              <a:solidFill>
+                <a:schemeClr val="bg1">
+                  <a:lumMod val="75000"/>
+                </a:schemeClr>
+              </a:solidFill>
+              <a:prstDash val="sysDot"/>
+              <a:headEnd type="none" w="med" len="med"/>
+              <a:tailEnd type="none" w="med" len="med"/>
+            </a:ln>
+            <a:effectLst/>
+          </p:spPr>
+          <p:style>
+            <a:lnRef idx="2">
+              <a:schemeClr val="accent1"/>
+            </a:lnRef>
+            <a:fillRef idx="0">
+              <a:schemeClr val="accent1"/>
+            </a:fillRef>
+            <a:effectRef idx="1">
+              <a:schemeClr val="accent1"/>
+            </a:effectRef>
+            <a:fontRef idx="minor">
+              <a:schemeClr val="tx1"/>
+            </a:fontRef>
+          </p:style>
+        </p:cxnSp>
+        <p:cxnSp>
+          <p:nvCxnSpPr>
+            <p:cNvPr id="15" name="Straight Connector 14"/>
+            <p:cNvCxnSpPr/>
+            <p:nvPr/>
+          </p:nvCxnSpPr>
+          <p:spPr>
+            <a:xfrm flipV="1">
+              <a:off x="2784624" y="2626240"/>
+              <a:ext cx="1195393" cy="2752"/>
+            </a:xfrm>
+            <a:prstGeom prst="line">
+              <a:avLst/>
+            </a:prstGeom>
+            <a:ln w="57150">
+              <a:solidFill>
+                <a:srgbClr val="FF0000"/>
+              </a:solidFill>
+              <a:headEnd type="none" w="med" len="med"/>
+              <a:tailEnd type="none" w="med" len="med"/>
+            </a:ln>
+            <a:effectLst/>
+          </p:spPr>
+          <p:style>
+            <a:lnRef idx="2">
+              <a:schemeClr val="accent1"/>
+            </a:lnRef>
+            <a:fillRef idx="0">
+              <a:schemeClr val="accent1"/>
+            </a:fillRef>
+            <a:effectRef idx="1">
+              <a:schemeClr val="accent1"/>
+            </a:effectRef>
+            <a:fontRef idx="minor">
+              <a:schemeClr val="tx1"/>
+            </a:fontRef>
+          </p:style>
+        </p:cxnSp>
+        <p:cxnSp>
+          <p:nvCxnSpPr>
+            <p:cNvPr id="16" name="Straight Connector 15"/>
+            <p:cNvCxnSpPr/>
+            <p:nvPr/>
+          </p:nvCxnSpPr>
+          <p:spPr>
+            <a:xfrm flipV="1">
+              <a:off x="3493284" y="2846185"/>
+              <a:ext cx="1075279" cy="2752"/>
+            </a:xfrm>
+            <a:prstGeom prst="line">
+              <a:avLst/>
+            </a:prstGeom>
+            <a:ln w="57150">
+              <a:solidFill>
+                <a:schemeClr val="accent5"/>
+              </a:solidFill>
+              <a:headEnd type="none" w="med" len="med"/>
+              <a:tailEnd type="none" w="med" len="med"/>
+            </a:ln>
+            <a:effectLst/>
+          </p:spPr>
+          <p:style>
+            <a:lnRef idx="2">
+              <a:schemeClr val="accent1"/>
+            </a:lnRef>
+            <a:fillRef idx="0">
+              <a:schemeClr val="accent1"/>
+            </a:fillRef>
+            <a:effectRef idx="1">
+              <a:schemeClr val="accent1"/>
+            </a:effectRef>
+            <a:fontRef idx="minor">
+              <a:schemeClr val="tx1"/>
+            </a:fontRef>
+          </p:style>
+        </p:cxnSp>
+        <p:cxnSp>
+          <p:nvCxnSpPr>
+            <p:cNvPr id="17" name="Straight Connector 16"/>
+            <p:cNvCxnSpPr/>
+            <p:nvPr/>
+          </p:nvCxnSpPr>
+          <p:spPr>
+            <a:xfrm flipV="1">
+              <a:off x="3502809" y="3066130"/>
+              <a:ext cx="1065754" cy="2749"/>
+            </a:xfrm>
+            <a:prstGeom prst="line">
+              <a:avLst/>
+            </a:prstGeom>
+            <a:ln w="57150">
+              <a:solidFill>
+                <a:schemeClr val="accent6"/>
+              </a:solidFill>
+              <a:headEnd type="none" w="med" len="med"/>
+              <a:tailEnd type="none" w="med" len="med"/>
+            </a:ln>
+            <a:effectLst/>
+          </p:spPr>
+          <p:style>
+            <a:lnRef idx="2">
+              <a:schemeClr val="accent1"/>
+            </a:lnRef>
+            <a:fillRef idx="0">
+              <a:schemeClr val="accent1"/>
+            </a:fillRef>
+            <a:effectRef idx="1">
+              <a:schemeClr val="accent1"/>
+            </a:effectRef>
+            <a:fontRef idx="minor">
+              <a:schemeClr val="tx1"/>
+            </a:fontRef>
+          </p:style>
+        </p:cxnSp>
+        <p:sp>
+          <p:nvSpPr>
+            <p:cNvPr id="81" name="Oval 80"/>
+            <p:cNvSpPr/>
+            <p:nvPr/>
+          </p:nvSpPr>
+          <p:spPr>
+            <a:xfrm>
+              <a:off x="2822665" y="2349338"/>
+              <a:ext cx="120660" cy="120660"/>
+            </a:xfrm>
+            <a:prstGeom prst="ellipse">
+              <a:avLst/>
+            </a:prstGeom>
+            <a:solidFill>
+              <a:schemeClr val="bg1">
+                <a:lumMod val="50000"/>
+              </a:schemeClr>
+            </a:solidFill>
+            <a:ln>
+              <a:noFill/>
+            </a:ln>
+            <a:effectLst/>
+          </p:spPr>
+          <p:style>
+            <a:lnRef idx="1">
+              <a:schemeClr val="accent1"/>
+            </a:lnRef>
+            <a:fillRef idx="3">
+              <a:schemeClr val="accent1"/>
+            </a:fillRef>
+            <a:effectRef idx="2">
+              <a:schemeClr val="accent1"/>
+            </a:effectRef>
+            <a:fontRef idx="minor">
+              <a:schemeClr val="lt1"/>
+            </a:fontRef>
+          </p:style>
+          <p:txBody>
+            <a:bodyPr rtlCol="0" anchor="ctr"/>
+            <a:lstStyle/>
+            <a:p>
+              <a:pPr algn="ctr"/>
+              <a:endParaRPr lang="en-US"/>
+            </a:p>
+          </p:txBody>
+        </p:sp>
+        <p:sp>
+          <p:nvSpPr>
+            <p:cNvPr id="82" name="Oval 81"/>
+            <p:cNvSpPr/>
+            <p:nvPr/>
+          </p:nvSpPr>
+          <p:spPr>
+            <a:xfrm>
+              <a:off x="3126302" y="2349338"/>
+              <a:ext cx="120660" cy="120660"/>
+            </a:xfrm>
+            <a:prstGeom prst="ellipse">
+              <a:avLst/>
+            </a:prstGeom>
+            <a:solidFill>
+              <a:schemeClr val="bg1">
+                <a:lumMod val="50000"/>
+              </a:schemeClr>
+            </a:solidFill>
+            <a:ln>
+              <a:noFill/>
+            </a:ln>
+            <a:effectLst/>
+          </p:spPr>
+          <p:style>
+            <a:lnRef idx="1">
+              <a:schemeClr val="accent1"/>
+            </a:lnRef>
+            <a:fillRef idx="3">
+              <a:schemeClr val="accent1"/>
+            </a:fillRef>
+            <a:effectRef idx="2">
+              <a:schemeClr val="accent1"/>
+            </a:effectRef>
+            <a:fontRef idx="minor">
+              <a:schemeClr val="lt1"/>
+            </a:fontRef>
+          </p:style>
+          <p:txBody>
+            <a:bodyPr rtlCol="0" anchor="ctr"/>
+            <a:lstStyle/>
+            <a:p>
+              <a:pPr algn="ctr"/>
+              <a:endParaRPr lang="en-US"/>
+            </a:p>
+          </p:txBody>
+        </p:sp>
+        <p:sp>
+          <p:nvSpPr>
+            <p:cNvPr id="83" name="Oval 82"/>
+            <p:cNvSpPr/>
+            <p:nvPr/>
+          </p:nvSpPr>
+          <p:spPr>
+            <a:xfrm>
+              <a:off x="4043881" y="2349338"/>
+              <a:ext cx="120660" cy="120660"/>
+            </a:xfrm>
+            <a:prstGeom prst="ellipse">
+              <a:avLst/>
+            </a:prstGeom>
+            <a:solidFill>
+              <a:schemeClr val="bg1">
+                <a:lumMod val="50000"/>
+              </a:schemeClr>
+            </a:solidFill>
+            <a:ln>
+              <a:noFill/>
+            </a:ln>
+            <a:effectLst/>
+          </p:spPr>
+          <p:style>
+            <a:lnRef idx="1">
+              <a:schemeClr val="accent1"/>
+            </a:lnRef>
+            <a:fillRef idx="3">
+              <a:schemeClr val="accent1"/>
+            </a:fillRef>
+            <a:effectRef idx="2">
+              <a:schemeClr val="accent1"/>
+            </a:effectRef>
+            <a:fontRef idx="minor">
+              <a:schemeClr val="lt1"/>
+            </a:fontRef>
+          </p:style>
+          <p:txBody>
+            <a:bodyPr rtlCol="0" anchor="ctr"/>
+            <a:lstStyle/>
+            <a:p>
+              <a:pPr algn="ctr"/>
+              <a:endParaRPr lang="en-US"/>
+            </a:p>
+          </p:txBody>
+        </p:sp>
+        <p:sp>
+          <p:nvSpPr>
+            <p:cNvPr id="84" name="Oval 83"/>
+            <p:cNvSpPr/>
+            <p:nvPr/>
+          </p:nvSpPr>
+          <p:spPr>
+            <a:xfrm>
+              <a:off x="4426638" y="2349338"/>
+              <a:ext cx="120660" cy="120660"/>
+            </a:xfrm>
+            <a:prstGeom prst="ellipse">
+              <a:avLst/>
+            </a:prstGeom>
+            <a:solidFill>
+              <a:schemeClr val="bg1">
+                <a:lumMod val="50000"/>
+              </a:schemeClr>
+            </a:solidFill>
+            <a:ln>
+              <a:noFill/>
+            </a:ln>
+            <a:effectLst/>
+          </p:spPr>
+          <p:style>
+            <a:lnRef idx="1">
+              <a:schemeClr val="accent1"/>
+            </a:lnRef>
+            <a:fillRef idx="3">
+              <a:schemeClr val="accent1"/>
+            </a:fillRef>
+            <a:effectRef idx="2">
+              <a:schemeClr val="accent1"/>
+            </a:effectRef>
+            <a:fontRef idx="minor">
+              <a:schemeClr val="lt1"/>
+            </a:fontRef>
+          </p:style>
+          <p:txBody>
+            <a:bodyPr rtlCol="0" anchor="ctr"/>
+            <a:lstStyle/>
+            <a:p>
+              <a:pPr algn="ctr"/>
+              <a:endParaRPr lang="en-US"/>
+            </a:p>
+          </p:txBody>
+        </p:sp>
+        <p:sp>
+          <p:nvSpPr>
+            <p:cNvPr id="85" name="Oval 84"/>
+            <p:cNvSpPr/>
+            <p:nvPr/>
+          </p:nvSpPr>
+          <p:spPr>
+            <a:xfrm>
+              <a:off x="3787476" y="2349338"/>
+              <a:ext cx="120660" cy="120660"/>
+            </a:xfrm>
+            <a:prstGeom prst="ellipse">
+              <a:avLst/>
+            </a:prstGeom>
+            <a:solidFill>
+              <a:schemeClr val="bg1"/>
+            </a:solidFill>
+            <a:ln w="28575">
+              <a:solidFill>
+                <a:schemeClr val="bg1">
+                  <a:lumMod val="50000"/>
+                </a:schemeClr>
+              </a:solidFill>
+            </a:ln>
+            <a:effectLst/>
+          </p:spPr>
+          <p:style>
+            <a:lnRef idx="1">
+              <a:schemeClr val="accent1"/>
+            </a:lnRef>
+            <a:fillRef idx="3">
+              <a:schemeClr val="accent1"/>
+            </a:fillRef>
+            <a:effectRef idx="2">
+              <a:schemeClr val="accent1"/>
+            </a:effectRef>
+            <a:fontRef idx="minor">
+              <a:schemeClr val="lt1"/>
+            </a:fontRef>
+          </p:style>
+          <p:txBody>
+            <a:bodyPr rtlCol="0" anchor="ctr"/>
+            <a:lstStyle/>
+            <a:p>
+              <a:pPr algn="ctr"/>
+              <a:endParaRPr lang="en-US"/>
+            </a:p>
+          </p:txBody>
+        </p:sp>
+        <p:sp>
+          <p:nvSpPr>
+            <p:cNvPr id="86" name="Oval 85"/>
+            <p:cNvSpPr/>
+            <p:nvPr/>
+          </p:nvSpPr>
+          <p:spPr>
+            <a:xfrm>
+              <a:off x="3512972" y="2349338"/>
+              <a:ext cx="120660" cy="120660"/>
+            </a:xfrm>
+            <a:prstGeom prst="ellipse">
+              <a:avLst/>
+            </a:prstGeom>
+            <a:solidFill>
+              <a:schemeClr val="bg1"/>
+            </a:solidFill>
+            <a:ln w="28575">
+              <a:solidFill>
+                <a:schemeClr val="bg1">
+                  <a:lumMod val="50000"/>
+                </a:schemeClr>
+              </a:solidFill>
+            </a:ln>
+            <a:effectLst/>
+          </p:spPr>
+          <p:style>
+            <a:lnRef idx="1">
+              <a:schemeClr val="accent1"/>
+            </a:lnRef>
+            <a:fillRef idx="3">
+              <a:schemeClr val="accent1"/>
+            </a:fillRef>
+            <a:effectRef idx="2">
+              <a:schemeClr val="accent1"/>
+            </a:effectRef>
+            <a:fontRef idx="minor">
+              <a:schemeClr val="lt1"/>
+            </a:fontRef>
+          </p:style>
+          <p:txBody>
+            <a:bodyPr rtlCol="0" anchor="ctr"/>
+            <a:lstStyle/>
+            <a:p>
+              <a:pPr algn="ctr"/>
+              <a:endParaRPr lang="en-US"/>
+            </a:p>
+          </p:txBody>
+        </p:sp>
+      </p:grpSp>
+    </p:spTree>
+    <p:extLst>
+      <p:ext uri="{BB962C8B-B14F-4D97-AF65-F5344CB8AC3E}">
+        <p14:creationId xmlns:p14="http://schemas.microsoft.com/office/powerpoint/2010/main" val="953263537"/>
       </p:ext>
     </p:extLst>
   </p:cSld>

</xml_diff>